<commit_message>
Page de garde et modification selon coaching du mentor
</commit_message>
<xml_diff>
--- a/OC Pizzeria.pptx
+++ b/OC Pizzeria.pptx
@@ -11,9 +11,8 @@
     <p:sldId id="259" r:id="rId5"/>
     <p:sldId id="260" r:id="rId6"/>
     <p:sldId id="262" r:id="rId7"/>
-    <p:sldId id="263" r:id="rId8"/>
-    <p:sldId id="264" r:id="rId9"/>
-    <p:sldId id="265" r:id="rId10"/>
+    <p:sldId id="264" r:id="rId8"/>
+    <p:sldId id="265" r:id="rId9"/>
   </p:sldIdLst>
   <p:sldSz cx="12192000" cy="6858000"/>
   <p:notesSz cx="6858000" cy="9144000"/>
@@ -112,6 +111,11 @@
       </a:defRPr>
     </a:lvl9pPr>
   </p:defaultTextStyle>
+  <p:extLst>
+    <p:ext uri="{EFAFB233-063F-42B5-8137-9DF3F51BA10A}">
+      <p15:sldGuideLst xmlns:p15="http://schemas.microsoft.com/office/powerpoint/2012/main"/>
+    </p:ext>
+  </p:extLst>
 </p:presentation>
 </file>
 
@@ -7638,16 +7642,29 @@
             <p:ph type="ctrTitle"/>
           </p:nvPr>
         </p:nvSpPr>
-        <p:spPr/>
+        <p:spPr>
+          <a:xfrm>
+            <a:off x="2516061" y="576072"/>
+            <a:ext cx="8915399" cy="2262781"/>
+          </a:xfrm>
+        </p:spPr>
         <p:txBody>
           <a:bodyPr/>
           <a:lstStyle/>
           <a:p>
             <a:r>
-              <a:rPr lang="fr-CH" dirty="0" smtClean="0"/>
+              <a:rPr lang="fr-CH" dirty="0" smtClean="0">
+                <a:solidFill>
+                  <a:srgbClr val="FF0000"/>
+                </a:solidFill>
+              </a:rPr>
               <a:t>OC Pizzeria</a:t>
             </a:r>
-            <a:endParaRPr lang="fr-CH" dirty="0"/>
+            <a:endParaRPr lang="fr-CH" dirty="0">
+              <a:solidFill>
+                <a:srgbClr val="FF0000"/>
+              </a:solidFill>
+            </a:endParaRPr>
           </a:p>
         </p:txBody>
       </p:sp>
@@ -7661,7 +7678,12 @@
             <p:ph type="subTitle" idx="1"/>
           </p:nvPr>
         </p:nvSpPr>
-        <p:spPr/>
+        <p:spPr>
+          <a:xfrm>
+            <a:off x="2890965" y="3158891"/>
+            <a:ext cx="8915399" cy="1126283"/>
+          </a:xfrm>
+        </p:spPr>
         <p:txBody>
           <a:bodyPr/>
           <a:lstStyle/>
@@ -7720,10 +7742,18 @@
           <a:lstStyle/>
           <a:p>
             <a:r>
-              <a:rPr lang="fr-CH" dirty="0" smtClean="0"/>
+              <a:rPr lang="fr-CH" dirty="0" smtClean="0">
+                <a:solidFill>
+                  <a:srgbClr val="FF0000"/>
+                </a:solidFill>
+              </a:rPr>
               <a:t>Contexte</a:t>
             </a:r>
-            <a:endParaRPr lang="fr-CH" dirty="0"/>
+            <a:endParaRPr lang="fr-CH" dirty="0">
+              <a:solidFill>
+                <a:srgbClr val="FF0000"/>
+              </a:solidFill>
+            </a:endParaRPr>
           </a:p>
         </p:txBody>
       </p:sp>
@@ -7844,10 +7874,18 @@
           <a:lstStyle/>
           <a:p>
             <a:r>
-              <a:rPr lang="fr-CH" dirty="0" smtClean="0"/>
+              <a:rPr lang="fr-CH" dirty="0" smtClean="0">
+                <a:solidFill>
+                  <a:srgbClr val="FF0000"/>
+                </a:solidFill>
+              </a:rPr>
               <a:t>Objectif: analyser les besoins du client</a:t>
             </a:r>
-            <a:endParaRPr lang="fr-CH" dirty="0"/>
+            <a:endParaRPr lang="fr-CH" dirty="0">
+              <a:solidFill>
+                <a:srgbClr val="FF0000"/>
+              </a:solidFill>
+            </a:endParaRPr>
           </a:p>
         </p:txBody>
       </p:sp>
@@ -7959,10 +7997,18 @@
           <a:lstStyle/>
           <a:p>
             <a:r>
-              <a:rPr lang="fr-CH" dirty="0" smtClean="0"/>
+              <a:rPr lang="fr-CH" dirty="0" smtClean="0">
+                <a:solidFill>
+                  <a:srgbClr val="FF0000"/>
+                </a:solidFill>
+              </a:rPr>
               <a:t>Contrainte</a:t>
             </a:r>
-            <a:endParaRPr lang="fr-CH" dirty="0"/>
+            <a:endParaRPr lang="fr-CH" dirty="0">
+              <a:solidFill>
+                <a:srgbClr val="FF0000"/>
+              </a:solidFill>
+            </a:endParaRPr>
           </a:p>
         </p:txBody>
       </p:sp>
@@ -8068,10 +8114,18 @@
           <a:lstStyle/>
           <a:p>
             <a:r>
-              <a:rPr lang="fr-CH" dirty="0" smtClean="0"/>
+              <a:rPr lang="fr-CH" dirty="0" smtClean="0">
+                <a:solidFill>
+                  <a:srgbClr val="FF0000"/>
+                </a:solidFill>
+              </a:rPr>
               <a:t>Fonctionnalités</a:t>
             </a:r>
-            <a:endParaRPr lang="fr-CH" dirty="0"/>
+            <a:endParaRPr lang="fr-CH" dirty="0">
+              <a:solidFill>
+                <a:srgbClr val="FF0000"/>
+              </a:solidFill>
+            </a:endParaRPr>
           </a:p>
         </p:txBody>
       </p:sp>
@@ -8164,14 +8218,26 @@
           <a:lstStyle/>
           <a:p>
             <a:r>
-              <a:rPr lang="fr-CH" dirty="0" smtClean="0"/>
+              <a:rPr lang="fr-CH" dirty="0" smtClean="0">
+                <a:solidFill>
+                  <a:srgbClr val="FF0000"/>
+                </a:solidFill>
+              </a:rPr>
               <a:t>Fonctionnalités: </a:t>
             </a:r>
             <a:r>
-              <a:rPr lang="fr-CH" sz="2700" dirty="0" smtClean="0"/>
+              <a:rPr lang="fr-CH" sz="2700" dirty="0" smtClean="0">
+                <a:solidFill>
+                  <a:srgbClr val="FF0000"/>
+                </a:solidFill>
+              </a:rPr>
               <a:t>diagramme de packages</a:t>
             </a:r>
-            <a:endParaRPr lang="fr-CH" sz="2700" dirty="0"/>
+            <a:endParaRPr lang="fr-CH" sz="2700" dirty="0">
+              <a:solidFill>
+                <a:srgbClr val="FF0000"/>
+              </a:solidFill>
+            </a:endParaRPr>
           </a:p>
         </p:txBody>
       </p:sp>
@@ -8254,24 +8320,26 @@
         <p:spPr>
           <a:xfrm>
             <a:off x="2592925" y="624110"/>
-            <a:ext cx="8911687" cy="517118"/>
+            <a:ext cx="8911687" cy="694327"/>
           </a:xfrm>
         </p:spPr>
         <p:txBody>
-          <a:bodyPr>
-            <a:normAutofit fontScale="90000"/>
-          </a:bodyPr>
+          <a:bodyPr/>
           <a:lstStyle/>
           <a:p>
             <a:r>
-              <a:rPr lang="fr-CH" dirty="0" smtClean="0"/>
-              <a:t>Fonctionnalités: </a:t>
-            </a:r>
-            <a:r>
-              <a:rPr lang="fr-CH" sz="3100" dirty="0" smtClean="0"/>
-              <a:t>gestion de commande</a:t>
-            </a:r>
-            <a:endParaRPr lang="fr-CH" sz="3100" dirty="0"/>
+              <a:rPr lang="fr-CH" dirty="0" smtClean="0">
+                <a:solidFill>
+                  <a:srgbClr val="FF0000"/>
+                </a:solidFill>
+              </a:rPr>
+              <a:t>Diagramme d’état d’une commande</a:t>
+            </a:r>
+            <a:endParaRPr lang="fr-CH" dirty="0">
+              <a:solidFill>
+                <a:srgbClr val="FF0000"/>
+              </a:solidFill>
+            </a:endParaRPr>
           </a:p>
         </p:txBody>
       </p:sp>
@@ -8299,15 +8367,15 @@
         </p:blipFill>
         <p:spPr>
           <a:xfrm>
-            <a:off x="2705087" y="1467625"/>
-            <a:ext cx="6862705" cy="5074942"/>
+            <a:off x="3054672" y="1557782"/>
+            <a:ext cx="6759185" cy="4479925"/>
           </a:xfrm>
         </p:spPr>
       </p:pic>
     </p:spTree>
     <p:extLst>
       <p:ext uri="{BB962C8B-B14F-4D97-AF65-F5344CB8AC3E}">
-        <p14:creationId xmlns:p14="http://schemas.microsoft.com/office/powerpoint/2010/main" val="880776450"/>
+        <p14:creationId xmlns:p14="http://schemas.microsoft.com/office/powerpoint/2010/main" val="2773422183"/>
       </p:ext>
     </p:extLst>
   </p:cSld>
@@ -8351,170 +8419,122 @@
             <p:ph type="title"/>
           </p:nvPr>
         </p:nvSpPr>
-        <p:spPr>
-          <a:xfrm>
-            <a:off x="2592925" y="624110"/>
-            <a:ext cx="8911687" cy="694327"/>
-          </a:xfrm>
-        </p:spPr>
+        <p:spPr/>
         <p:txBody>
           <a:bodyPr/>
           <a:lstStyle/>
           <a:p>
             <a:r>
+              <a:rPr lang="fr-CH" dirty="0" smtClean="0">
+                <a:solidFill>
+                  <a:srgbClr val="FF0000"/>
+                </a:solidFill>
+              </a:rPr>
+              <a:t>Solution</a:t>
+            </a:r>
+            <a:endParaRPr lang="fr-CH" dirty="0">
+              <a:solidFill>
+                <a:srgbClr val="FF0000"/>
+              </a:solidFill>
+            </a:endParaRPr>
+          </a:p>
+        </p:txBody>
+      </p:sp>
+      <p:sp>
+        <p:nvSpPr>
+          <p:cNvPr id="3" name="Espace réservé du contenu 2"/>
+          <p:cNvSpPr>
+            <a:spLocks noGrp="1"/>
+          </p:cNvSpPr>
+          <p:nvPr>
+            <p:ph idx="1"/>
+          </p:nvPr>
+        </p:nvSpPr>
+        <p:spPr/>
+        <p:txBody>
+          <a:bodyPr/>
+          <a:lstStyle/>
+          <a:p>
+            <a:r>
               <a:rPr lang="fr-CH" dirty="0" smtClean="0"/>
-              <a:t>Diagramme d’état d’une commande</a:t>
-            </a:r>
+              <a:t>Conception d’une application web portative.</a:t>
+            </a:r>
+          </a:p>
+          <a:p>
+            <a:r>
+              <a:rPr lang="fr-CH" dirty="0"/>
+              <a:t>En langage </a:t>
+            </a:r>
+            <a:r>
+              <a:rPr lang="fr-CH" dirty="0" smtClean="0"/>
+              <a:t>JSF car </a:t>
+            </a:r>
+            <a:r>
+              <a:rPr lang="fr-FR" dirty="0" smtClean="0"/>
+              <a:t>propose une </a:t>
+            </a:r>
+            <a:r>
+              <a:rPr lang="fr-FR" dirty="0"/>
+              <a:t>bonne péréquation entre la conception d’interfaces simples et la création de client Web </a:t>
+            </a:r>
+            <a:r>
+              <a:rPr lang="fr-FR" dirty="0" smtClean="0"/>
+              <a:t>riches.</a:t>
+            </a:r>
+          </a:p>
+          <a:p>
+            <a:r>
+              <a:rPr lang="fr-FR" dirty="0" smtClean="0"/>
+              <a:t>L’application intègrera une base de donnée relationnelle, qui sera exploitée par </a:t>
+            </a:r>
+            <a:r>
+              <a:rPr lang="fr-FR" dirty="0" err="1" smtClean="0"/>
+              <a:t>sql</a:t>
+            </a:r>
+            <a:r>
+              <a:rPr lang="fr-FR" dirty="0" smtClean="0"/>
+              <a:t>.</a:t>
+            </a:r>
+            <a:endParaRPr lang="fr-CH" dirty="0" smtClean="0"/>
+          </a:p>
+          <a:p>
+            <a:r>
+              <a:rPr lang="fr-CH" dirty="0" smtClean="0"/>
+              <a:t>L’application sera multiplateforme, permettant ainsi une large utilisation par des détenteur des divers appareils </a:t>
+            </a:r>
+            <a:r>
+              <a:rPr lang="fr-CH" dirty="0" err="1" smtClean="0"/>
+              <a:t>électronics</a:t>
+            </a:r>
+            <a:endParaRPr lang="fr-CH" dirty="0" smtClean="0"/>
+          </a:p>
+          <a:p>
+            <a:endParaRPr lang="fr-CH" dirty="0" smtClean="0"/>
+          </a:p>
+          <a:p>
+            <a:endParaRPr lang="fr-CH" dirty="0" smtClean="0"/>
+          </a:p>
+          <a:p>
+            <a:endParaRPr lang="fr-CH" dirty="0" smtClean="0"/>
+          </a:p>
+          <a:p>
+            <a:endParaRPr lang="fr-CH" dirty="0" smtClean="0"/>
+          </a:p>
+          <a:p>
             <a:endParaRPr lang="fr-CH" dirty="0"/>
           </a:p>
         </p:txBody>
       </p:sp>
-      <p:pic>
-        <p:nvPicPr>
-          <p:cNvPr id="4" name="Espace réservé du contenu 3"/>
-          <p:cNvPicPr>
-            <a:picLocks noGrp="1" noChangeAspect="1"/>
-          </p:cNvPicPr>
-          <p:nvPr>
-            <p:ph idx="1"/>
-          </p:nvPr>
-        </p:nvPicPr>
-        <p:blipFill>
-          <a:blip r:embed="rId2">
-            <a:extLst>
-              <a:ext uri="{28A0092B-C50C-407E-A947-70E740481C1C}">
-                <a14:useLocalDpi xmlns:a14="http://schemas.microsoft.com/office/drawing/2010/main" val="0"/>
-              </a:ext>
-            </a:extLst>
-          </a:blip>
-          <a:stretch>
-            <a:fillRect/>
-          </a:stretch>
-        </p:blipFill>
-        <p:spPr>
-          <a:xfrm>
-            <a:off x="3667320" y="1530350"/>
-            <a:ext cx="6759185" cy="4479925"/>
-          </a:xfrm>
-        </p:spPr>
-      </p:pic>
     </p:spTree>
     <p:extLst>
       <p:ext uri="{BB962C8B-B14F-4D97-AF65-F5344CB8AC3E}">
-        <p14:creationId xmlns:p14="http://schemas.microsoft.com/office/powerpoint/2010/main" val="2773422183"/>
+        <p14:creationId xmlns:p14="http://schemas.microsoft.com/office/powerpoint/2010/main" val="3940917138"/>
       </p:ext>
     </p:extLst>
   </p:cSld>
   <p:clrMapOvr>
     <a:masterClrMapping/>
   </p:clrMapOvr>
-  <p:timing>
-    <p:tnLst>
-      <p:par>
-        <p:cTn id="1" dur="indefinite" restart="never" nodeType="tmRoot"/>
-      </p:par>
-    </p:tnLst>
-  </p:timing>
-</p:sld>
-</file>
-
-<file path=ppt/slides/slide9.xml><?xml version="1.0" encoding="utf-8"?>
-<p:sld xmlns:a="http://schemas.openxmlformats.org/drawingml/2006/main" xmlns:r="http://schemas.openxmlformats.org/officeDocument/2006/relationships" xmlns:p="http://schemas.openxmlformats.org/presentationml/2006/main">
-  <p:cSld>
-    <p:spTree>
-      <p:nvGrpSpPr>
-        <p:cNvPr id="1" name=""/>
-        <p:cNvGrpSpPr/>
-        <p:nvPr/>
-      </p:nvGrpSpPr>
-      <p:grpSpPr>
-        <a:xfrm>
-          <a:off x="0" y="0"/>
-          <a:ext cx="0" cy="0"/>
-          <a:chOff x="0" y="0"/>
-          <a:chExt cx="0" cy="0"/>
-        </a:xfrm>
-      </p:grpSpPr>
-      <p:sp>
-        <p:nvSpPr>
-          <p:cNvPr id="2" name="Titre 1"/>
-          <p:cNvSpPr>
-            <a:spLocks noGrp="1"/>
-          </p:cNvSpPr>
-          <p:nvPr>
-            <p:ph type="title"/>
-          </p:nvPr>
-        </p:nvSpPr>
-        <p:spPr>
-          <a:xfrm>
-            <a:off x="2592925" y="312221"/>
-            <a:ext cx="8911687" cy="524206"/>
-          </a:xfrm>
-        </p:spPr>
-        <p:txBody>
-          <a:bodyPr>
-            <a:normAutofit fontScale="90000"/>
-          </a:bodyPr>
-          <a:lstStyle/>
-          <a:p>
-            <a:r>
-              <a:rPr lang="fr-CH" dirty="0" smtClean="0"/>
-              <a:t>Diagramme d’activité: </a:t>
-            </a:r>
-            <a:r>
-              <a:rPr lang="fr-CH" sz="2700" dirty="0" smtClean="0"/>
-              <a:t>gestion commande</a:t>
-            </a:r>
-            <a:endParaRPr lang="fr-CH" sz="2700" dirty="0"/>
-          </a:p>
-        </p:txBody>
-      </p:sp>
-      <p:pic>
-        <p:nvPicPr>
-          <p:cNvPr id="4" name="Espace réservé du contenu 3"/>
-          <p:cNvPicPr>
-            <a:picLocks noGrp="1" noChangeAspect="1"/>
-          </p:cNvPicPr>
-          <p:nvPr>
-            <p:ph idx="1"/>
-          </p:nvPr>
-        </p:nvPicPr>
-        <p:blipFill>
-          <a:blip r:embed="rId2">
-            <a:extLst>
-              <a:ext uri="{28A0092B-C50C-407E-A947-70E740481C1C}">
-                <a14:useLocalDpi xmlns:a14="http://schemas.microsoft.com/office/drawing/2010/main" val="0"/>
-              </a:ext>
-            </a:extLst>
-          </a:blip>
-          <a:stretch>
-            <a:fillRect/>
-          </a:stretch>
-        </p:blipFill>
-        <p:spPr>
-          <a:xfrm>
-            <a:off x="4182138" y="1033113"/>
-            <a:ext cx="5004392" cy="5425464"/>
-          </a:xfrm>
-        </p:spPr>
-      </p:pic>
-    </p:spTree>
-    <p:extLst>
-      <p:ext uri="{BB962C8B-B14F-4D97-AF65-F5344CB8AC3E}">
-        <p14:creationId xmlns:p14="http://schemas.microsoft.com/office/powerpoint/2010/main" val="3826048290"/>
-      </p:ext>
-    </p:extLst>
-  </p:cSld>
-  <p:clrMapOvr>
-    <a:masterClrMapping/>
-  </p:clrMapOvr>
-  <p:timing>
-    <p:tnLst>
-      <p:par>
-        <p:cTn id="1" dur="indefinite" restart="never" nodeType="tmRoot"/>
-      </p:par>
-    </p:tnLst>
-  </p:timing>
 </p:sld>
 </file>
 

</xml_diff>

<commit_message>
udpate powerpoint and doc
</commit_message>
<xml_diff>
--- a/OC Pizzeria.pptx
+++ b/OC Pizzeria.pptx
@@ -308,7 +308,7 @@
             <a:fld id="{B61BEF0D-F0BB-DE4B-95CE-6DB70DBA9567}" type="datetimeFigureOut">
               <a:rPr lang="en-US" dirty="0"/>
               <a:pPr/>
-              <a:t>12/12/2018</a:t>
+              <a:t>12/20/2018</a:t>
             </a:fld>
             <a:endParaRPr lang="en-US" dirty="0"/>
           </a:p>
@@ -643,7 +643,7 @@
             <a:fld id="{B61BEF0D-F0BB-DE4B-95CE-6DB70DBA9567}" type="datetimeFigureOut">
               <a:rPr lang="en-US" dirty="0"/>
               <a:pPr/>
-              <a:t>12/12/2018</a:t>
+              <a:t>12/20/2018</a:t>
             </a:fld>
             <a:endParaRPr lang="en-US" dirty="0"/>
           </a:p>
@@ -1041,7 +1041,7 @@
             <a:fld id="{B61BEF0D-F0BB-DE4B-95CE-6DB70DBA9567}" type="datetimeFigureOut">
               <a:rPr lang="en-US" dirty="0"/>
               <a:pPr/>
-              <a:t>12/12/2018</a:t>
+              <a:t>12/20/2018</a:t>
             </a:fld>
             <a:endParaRPr lang="en-US" dirty="0"/>
           </a:p>
@@ -1374,7 +1374,7 @@
             <a:fld id="{B61BEF0D-F0BB-DE4B-95CE-6DB70DBA9567}" type="datetimeFigureOut">
               <a:rPr lang="en-US" dirty="0"/>
               <a:pPr/>
-              <a:t>12/12/2018</a:t>
+              <a:t>12/20/2018</a:t>
             </a:fld>
             <a:endParaRPr lang="en-US" dirty="0"/>
           </a:p>
@@ -1691,7 +1691,7 @@
             <a:fld id="{B61BEF0D-F0BB-DE4B-95CE-6DB70DBA9567}" type="datetimeFigureOut">
               <a:rPr lang="en-US" dirty="0"/>
               <a:pPr/>
-              <a:t>12/12/2018</a:t>
+              <a:t>12/20/2018</a:t>
             </a:fld>
             <a:endParaRPr lang="en-US" dirty="0"/>
           </a:p>
@@ -2084,7 +2084,7 @@
             <a:fld id="{B61BEF0D-F0BB-DE4B-95CE-6DB70DBA9567}" type="datetimeFigureOut">
               <a:rPr lang="en-US" dirty="0"/>
               <a:pPr/>
-              <a:t>12/12/2018</a:t>
+              <a:t>12/20/2018</a:t>
             </a:fld>
             <a:endParaRPr lang="en-US" dirty="0"/>
           </a:p>
@@ -2338,7 +2338,7 @@
             <a:fld id="{B61BEF0D-F0BB-DE4B-95CE-6DB70DBA9567}" type="datetimeFigureOut">
               <a:rPr lang="en-US" dirty="0"/>
               <a:pPr/>
-              <a:t>12/12/2018</a:t>
+              <a:t>12/20/2018</a:t>
             </a:fld>
             <a:endParaRPr lang="en-US" dirty="0"/>
           </a:p>
@@ -2597,7 +2597,7 @@
             <a:fld id="{B61BEF0D-F0BB-DE4B-95CE-6DB70DBA9567}" type="datetimeFigureOut">
               <a:rPr lang="en-US" dirty="0"/>
               <a:pPr/>
-              <a:t>12/12/2018</a:t>
+              <a:t>12/20/2018</a:t>
             </a:fld>
             <a:endParaRPr lang="en-US" dirty="0"/>
           </a:p>
@@ -2856,7 +2856,7 @@
             <a:fld id="{B61BEF0D-F0BB-DE4B-95CE-6DB70DBA9567}" type="datetimeFigureOut">
               <a:rPr lang="en-US" dirty="0"/>
               <a:pPr/>
-              <a:t>12/12/2018</a:t>
+              <a:t>12/20/2018</a:t>
             </a:fld>
             <a:endParaRPr lang="en-US" dirty="0"/>
           </a:p>
@@ -3182,7 +3182,7 @@
             <a:fld id="{B61BEF0D-F0BB-DE4B-95CE-6DB70DBA9567}" type="datetimeFigureOut">
               <a:rPr lang="en-US" dirty="0"/>
               <a:pPr/>
-              <a:t>12/12/2018</a:t>
+              <a:t>12/20/2018</a:t>
             </a:fld>
             <a:endParaRPr lang="en-US" dirty="0"/>
           </a:p>
@@ -3502,7 +3502,7 @@
             <a:fld id="{B61BEF0D-F0BB-DE4B-95CE-6DB70DBA9567}" type="datetimeFigureOut">
               <a:rPr lang="en-US" dirty="0"/>
               <a:pPr/>
-              <a:t>12/12/2018</a:t>
+              <a:t>12/20/2018</a:t>
             </a:fld>
             <a:endParaRPr lang="en-US" dirty="0"/>
           </a:p>
@@ -3956,7 +3956,7 @@
             <a:fld id="{B61BEF0D-F0BB-DE4B-95CE-6DB70DBA9567}" type="datetimeFigureOut">
               <a:rPr lang="en-US" dirty="0"/>
               <a:pPr/>
-              <a:t>12/12/2018</a:t>
+              <a:t>12/20/2018</a:t>
             </a:fld>
             <a:endParaRPr lang="en-US" dirty="0"/>
           </a:p>
@@ -4158,7 +4158,7 @@
             <a:fld id="{B61BEF0D-F0BB-DE4B-95CE-6DB70DBA9567}" type="datetimeFigureOut">
               <a:rPr lang="en-US" dirty="0"/>
               <a:pPr/>
-              <a:t>12/12/2018</a:t>
+              <a:t>12/20/2018</a:t>
             </a:fld>
             <a:endParaRPr lang="en-US" dirty="0"/>
           </a:p>
@@ -4332,7 +4332,7 @@
             <a:fld id="{B61BEF0D-F0BB-DE4B-95CE-6DB70DBA9567}" type="datetimeFigureOut">
               <a:rPr lang="en-US" dirty="0"/>
               <a:pPr/>
-              <a:t>12/12/2018</a:t>
+              <a:t>12/20/2018</a:t>
             </a:fld>
             <a:endParaRPr lang="en-US" dirty="0"/>
           </a:p>
@@ -4662,7 +4662,7 @@
             <a:fld id="{B61BEF0D-F0BB-DE4B-95CE-6DB70DBA9567}" type="datetimeFigureOut">
               <a:rPr lang="en-US" dirty="0"/>
               <a:pPr/>
-              <a:t>12/12/2018</a:t>
+              <a:t>12/20/2018</a:t>
             </a:fld>
             <a:endParaRPr lang="en-US" dirty="0"/>
           </a:p>
@@ -5004,7 +5004,7 @@
             <a:fld id="{B61BEF0D-F0BB-DE4B-95CE-6DB70DBA9567}" type="datetimeFigureOut">
               <a:rPr lang="en-US" dirty="0"/>
               <a:pPr/>
-              <a:t>12/12/2018</a:t>
+              <a:t>12/20/2018</a:t>
             </a:fld>
             <a:endParaRPr lang="en-US" dirty="0"/>
           </a:p>
@@ -7118,7 +7118,7 @@
             <a:fld id="{B61BEF0D-F0BB-DE4B-95CE-6DB70DBA9567}" type="datetimeFigureOut">
               <a:rPr lang="en-US" dirty="0"/>
               <a:pPr/>
-              <a:t>12/12/2018</a:t>
+              <a:t>12/20/2018</a:t>
             </a:fld>
             <a:endParaRPr lang="en-US" dirty="0"/>
           </a:p>
@@ -7781,44 +7781,48 @@
           <a:p>
             <a:r>
               <a:rPr lang="fr-CH" dirty="0" smtClean="0"/>
-              <a:t>Nécessité d’une gestion efficace d’un groupe de Pizzéria</a:t>
-            </a:r>
-          </a:p>
-          <a:p>
+              <a:t>Nécessité d’une gestion efficace d’un groupe de </a:t>
+            </a:r>
             <a:r>
               <a:rPr lang="fr-CH" dirty="0" smtClean="0"/>
-              <a:t>La gestion des commandes, de leur réception à la livraison, passant par sa réalisation </a:t>
-            </a:r>
-          </a:p>
-          <a:p>
+              <a:t>Pizzéria</a:t>
+            </a:r>
+            <a:endParaRPr lang="fr-CH" dirty="0" smtClean="0"/>
+          </a:p>
+          <a:p>
+            <a:r>
+              <a:rPr lang="fr-CH" dirty="0"/>
+              <a:t>C</a:t>
+            </a:r>
             <a:r>
               <a:rPr lang="fr-CH" dirty="0" smtClean="0"/>
-              <a:t>Les commandes se feront en ligne, par téléphone tout comme sur place des commandes. Aussi, le payement peut se faire en ligne</a:t>
-            </a:r>
+              <a:t>ommande en ligne, par téléphone ou sur place</a:t>
+            </a:r>
+            <a:endParaRPr lang="fr-CH" dirty="0" smtClean="0"/>
           </a:p>
           <a:p>
             <a:r>
               <a:rPr lang="fr-CH" dirty="0" smtClean="0"/>
-              <a:t>Modification ou annulation des commandes passées et en attentes de réalisation</a:t>
-            </a:r>
-          </a:p>
-          <a:p>
+              <a:t>Une suivie en temps réel des commandes </a:t>
+            </a:r>
             <a:r>
               <a:rPr lang="fr-CH" dirty="0" smtClean="0"/>
-              <a:t>Une suivie en temps réel des commandes passées, en préparations</a:t>
-            </a:r>
+              <a:t>passées</a:t>
+            </a:r>
+            <a:endParaRPr lang="fr-CH" dirty="0" smtClean="0"/>
           </a:p>
           <a:p>
             <a:r>
               <a:rPr lang="fr-CH" dirty="0" smtClean="0"/>
-              <a:t>Une suivie en temps réel du stock des ingrédients restant pour la réalisation des pizzas</a:t>
+              <a:t>Une suivie en temps réel du stock des ingrédients </a:t>
             </a:r>
           </a:p>
           <a:p>
             <a:r>
               <a:rPr lang="fr-CH" dirty="0" smtClean="0"/>
-              <a:t>Proposition d’une aide mémoire aux pizzaiolos indiquant le recette pour chaque pizza</a:t>
-            </a:r>
+              <a:t>Aides mémoire réalisation de Pizza.</a:t>
+            </a:r>
+            <a:endParaRPr lang="fr-CH" dirty="0" smtClean="0"/>
           </a:p>
           <a:p>
             <a:endParaRPr lang="fr-CH" dirty="0" smtClean="0"/>
@@ -7930,14 +7934,25 @@
           <a:p>
             <a:r>
               <a:rPr lang="fr-CH" dirty="0" smtClean="0"/>
-              <a:t>Choisir une solution technique adaptée</a:t>
-            </a:r>
-          </a:p>
-          <a:p>
+              <a:t>Choisir une solution technique </a:t>
+            </a:r>
             <a:r>
               <a:rPr lang="fr-CH" dirty="0" smtClean="0"/>
-              <a:t>Nous nous baserons sur des diagrammes UML pour notre analyse.</a:t>
-            </a:r>
+              <a:t>adaptée</a:t>
+            </a:r>
+          </a:p>
+          <a:p>
+            <a:r>
+              <a:rPr lang="fr-CH" dirty="0" smtClean="0"/>
+              <a:t>Analyse basée sur des diagrammes UML (Langage de modélisation).</a:t>
+            </a:r>
+            <a:endParaRPr lang="fr-CH" dirty="0" smtClean="0"/>
+          </a:p>
+          <a:p>
+            <a:pPr marL="0" indent="0">
+              <a:buNone/>
+            </a:pPr>
+            <a:endParaRPr lang="fr-CH" dirty="0" smtClean="0"/>
           </a:p>
           <a:p>
             <a:endParaRPr lang="fr-CH" dirty="0"/>
@@ -8029,13 +8044,40 @@
           <a:p>
             <a:r>
               <a:rPr lang="fr-CH" dirty="0" smtClean="0"/>
-              <a:t>Le groupe est composé de 5 pizzerias et compte s’agrandir. Nous devons en tenir compte et proposer une solution évolutives:</a:t>
-            </a:r>
-          </a:p>
-          <a:p>
+              <a:t>Le </a:t>
+            </a:r>
             <a:r>
               <a:rPr lang="fr-CH" dirty="0" smtClean="0"/>
-              <a:t>Dans la gestion des commandes, des stocks, livraison</a:t>
+              <a:t>groupe </a:t>
+            </a:r>
+            <a:r>
+              <a:rPr lang="fr-CH" dirty="0" smtClean="0"/>
+              <a:t>est composé de 5 pizzerias et </a:t>
+            </a:r>
+            <a:r>
+              <a:rPr lang="fr-CH" dirty="0" smtClean="0"/>
+              <a:t>compte s’agrandir</a:t>
+            </a:r>
+            <a:r>
+              <a:rPr lang="fr-CH" dirty="0" smtClean="0"/>
+              <a:t>. </a:t>
+            </a:r>
+          </a:p>
+          <a:p>
+            <a:r>
+              <a:rPr lang="fr-CH" dirty="0" smtClean="0"/>
+              <a:t>Nous devons en tenir compte et proposer une solution évolutives</a:t>
+            </a:r>
+            <a:endParaRPr lang="fr-CH" dirty="0" smtClean="0"/>
+          </a:p>
+          <a:p>
+            <a:r>
+              <a:rPr lang="fr-CH" dirty="0" smtClean="0"/>
+              <a:t>Dans </a:t>
+            </a:r>
+            <a:r>
+              <a:rPr lang="fr-CH" dirty="0" smtClean="0"/>
+              <a:t>la gestion des commandes, des stocks, livraison</a:t>
             </a:r>
           </a:p>
           <a:p>
@@ -8047,7 +8089,15 @@
           <a:p>
             <a:r>
               <a:rPr lang="fr-CH" dirty="0" smtClean="0"/>
-              <a:t>Mettre en place un système d’optimisation du temps de livraison de la commande</a:t>
+              <a:t>Avec</a:t>
+            </a:r>
+            <a:r>
+              <a:rPr lang="fr-CH" dirty="0" smtClean="0"/>
+              <a:t> </a:t>
+            </a:r>
+            <a:r>
+              <a:rPr lang="fr-CH" dirty="0" smtClean="0"/>
+              <a:t>un système d’optimisation du temps de livraison de la commande</a:t>
             </a:r>
           </a:p>
           <a:p>
@@ -8345,7 +8395,7 @@
       </p:sp>
       <p:pic>
         <p:nvPicPr>
-          <p:cNvPr id="4" name="Espace réservé du contenu 3"/>
+          <p:cNvPr id="10" name="Espace réservé du contenu 9"/>
           <p:cNvPicPr>
             <a:picLocks noGrp="1" noChangeAspect="1"/>
           </p:cNvPicPr>
@@ -8367,8 +8417,8 @@
         </p:blipFill>
         <p:spPr>
           <a:xfrm>
-            <a:off x="3054672" y="1557782"/>
-            <a:ext cx="6759185" cy="4479925"/>
+            <a:off x="2898648" y="1507288"/>
+            <a:ext cx="7263664" cy="4404562"/>
           </a:xfrm>
         </p:spPr>
       </p:pic>
@@ -8467,20 +8517,19 @@
             </a:r>
             <a:r>
               <a:rPr lang="fr-CH" dirty="0" smtClean="0"/>
-              <a:t>JSF car </a:t>
-            </a:r>
-            <a:r>
-              <a:rPr lang="fr-FR" dirty="0" smtClean="0"/>
-              <a:t>propose une </a:t>
-            </a:r>
-            <a:r>
-              <a:rPr lang="fr-FR" dirty="0"/>
-              <a:t>bonne péréquation entre la conception d’interfaces simples et la création de client Web </a:t>
-            </a:r>
-            <a:r>
-              <a:rPr lang="fr-FR" dirty="0" smtClean="0"/>
-              <a:t>riches.</a:t>
-            </a:r>
+              <a:t>Java </a:t>
+            </a:r>
+            <a:r>
+              <a:rPr lang="fr-CH" dirty="0" smtClean="0"/>
+              <a:t>Server Faces (JSF), </a:t>
+            </a:r>
+          </a:p>
+          <a:p>
+            <a:r>
+              <a:rPr lang="fr-CH" dirty="0" smtClean="0"/>
+              <a:t>Facilite de développement d’interface d’utilisateurs Web.</a:t>
+            </a:r>
+            <a:endParaRPr lang="fr-FR" dirty="0" smtClean="0"/>
           </a:p>
           <a:p>
             <a:r>
@@ -8500,15 +8549,29 @@
           <a:p>
             <a:r>
               <a:rPr lang="fr-CH" dirty="0" smtClean="0"/>
-              <a:t>L’application sera multiplateforme, permettant ainsi une large utilisation par des détenteur des divers appareils </a:t>
-            </a:r>
-            <a:r>
-              <a:rPr lang="fr-CH" dirty="0" err="1" smtClean="0"/>
-              <a:t>électronics</a:t>
+              <a:t>L’application sera multiplateforme, </a:t>
             </a:r>
             <a:endParaRPr lang="fr-CH" dirty="0" smtClean="0"/>
           </a:p>
           <a:p>
+            <a:r>
+              <a:rPr lang="fr-CH" dirty="0" smtClean="0"/>
+              <a:t>Utilisation sur </a:t>
+            </a:r>
+            <a:r>
+              <a:rPr lang="fr-CH" dirty="0" smtClean="0"/>
+              <a:t>divers </a:t>
+            </a:r>
+            <a:r>
+              <a:rPr lang="fr-CH" dirty="0" smtClean="0"/>
+              <a:t>type d’appareils </a:t>
+            </a:r>
+            <a:r>
+              <a:rPr lang="fr-CH" dirty="0" smtClean="0"/>
+              <a:t>électroniques</a:t>
+            </a:r>
+          </a:p>
+          <a:p>
             <a:endParaRPr lang="fr-CH" dirty="0" smtClean="0"/>
           </a:p>
           <a:p>
@@ -8518,6 +8581,9 @@
             <a:endParaRPr lang="fr-CH" dirty="0" smtClean="0"/>
           </a:p>
           <a:p>
+            <a:pPr marL="0" indent="0">
+              <a:buNone/>
+            </a:pPr>
             <a:endParaRPr lang="fr-CH" dirty="0" smtClean="0"/>
           </a:p>
           <a:p>

</xml_diff>